<commit_message>
New SS added for new UI. Live Feed Box Fixes Incomplete.
</commit_message>
<xml_diff>
--- a/Final PPT.pptx
+++ b/Final PPT.pptx
@@ -278,7 +278,7 @@
       <p15:sldGuideLst xmlns:p15="http://schemas.microsoft.com/office/powerpoint/2012/main"/>
     </p:ext>
     <p:ext uri="GoogleSlidesCustomDataVersion2">
-      <go:slidesCustomData xmlns="" xmlns:mc="http://schemas.openxmlformats.org/markup-compatibility/2006" xmlns:mv="urn:schemas-microsoft-com:mac:vml" xmlns:c="http://schemas.openxmlformats.org/drawingml/2006/chart" xmlns:dgm="http://schemas.openxmlformats.org/drawingml/2006/diagram" xmlns:o="urn:schemas-microsoft-com:office:office" xmlns:v="urn:schemas-microsoft-com:vml" xmlns:pvml="urn:schemas-microsoft-com:office:powerpoint" xmlns:com="http://schemas.openxmlformats.org/drawingml/2006/compatibility" xmlns:p14="http://schemas.microsoft.com/office/powerpoint/2010/main" xmlns:p15="http://schemas.microsoft.com/office/powerpoint/2012/main" xmlns:ahyp="http://schemas.microsoft.com/office/drawing/2018/hyperlinkcolor" xmlns:go="http://customooxmlschemas.google.com/" r:id="rId22" roundtripDataSignature="AMtx7miRrbFGHO4lggu6m9ffZxEtEwdD8g=="/>
+      <go:slidesCustomData xmlns:go="http://customooxmlschemas.google.com/" xmlns:ahyp="http://schemas.microsoft.com/office/drawing/2018/hyperlinkcolor" xmlns:p15="http://schemas.microsoft.com/office/powerpoint/2012/main" xmlns:p14="http://schemas.microsoft.com/office/powerpoint/2010/main" xmlns:com="http://schemas.openxmlformats.org/drawingml/2006/compatibility" xmlns:pvml="urn:schemas-microsoft-com:office:powerpoint" xmlns:v="urn:schemas-microsoft-com:vml" xmlns:o="urn:schemas-microsoft-com:office:office" xmlns:dgm="http://schemas.openxmlformats.org/drawingml/2006/diagram" xmlns:c="http://schemas.openxmlformats.org/drawingml/2006/chart" xmlns:mv="urn:schemas-microsoft-com:mac:vml" xmlns:mc="http://schemas.openxmlformats.org/markup-compatibility/2006" xmlns="" r:id="rId22" roundtripDataSignature="AMtx7miRrbFGHO4lggu6m9ffZxEtEwdD8g=="/>
     </p:ext>
   </p:extLst>
 </p:presentation>
@@ -17864,129 +17864,6 @@
           </a:p>
         </p:txBody>
       </p:sp>
-      <p:pic>
-        <p:nvPicPr>
-          <p:cNvPr id="5" name="Picture 4" descr="A screenshot of a video game&#10;&#10;AI-generated content may be incorrect.">
-            <a:extLst>
-              <a:ext uri="{FF2B5EF4-FFF2-40B4-BE49-F238E27FC236}">
-                <a16:creationId xmlns:a16="http://schemas.microsoft.com/office/drawing/2014/main" id="{229D70F8-A8F1-3BEA-47E6-A24703A0CC6F}"/>
-              </a:ext>
-            </a:extLst>
-          </p:cNvPr>
-          <p:cNvPicPr>
-            <a:picLocks noChangeAspect="1"/>
-          </p:cNvPicPr>
-          <p:nvPr/>
-        </p:nvPicPr>
-        <p:blipFill>
-          <a:blip r:embed="rId4"/>
-          <a:stretch>
-            <a:fillRect/>
-          </a:stretch>
-        </p:blipFill>
-        <p:spPr>
-          <a:xfrm>
-            <a:off x="6058232" y="1035181"/>
-            <a:ext cx="2055251" cy="3354558"/>
-          </a:xfrm>
-          <a:prstGeom prst="roundRect">
-            <a:avLst>
-              <a:gd name="adj" fmla="val 8594"/>
-            </a:avLst>
-          </a:prstGeom>
-          <a:solidFill>
-            <a:srgbClr val="FFFFFF">
-              <a:shade val="85000"/>
-            </a:srgbClr>
-          </a:solidFill>
-          <a:ln>
-            <a:noFill/>
-          </a:ln>
-          <a:effectLst/>
-        </p:spPr>
-      </p:pic>
-      <p:pic>
-        <p:nvPicPr>
-          <p:cNvPr id="7" name="Picture 6" descr="A screen shot of a cellphone&#10;&#10;AI-generated content may be incorrect.">
-            <a:extLst>
-              <a:ext uri="{FF2B5EF4-FFF2-40B4-BE49-F238E27FC236}">
-                <a16:creationId xmlns:a16="http://schemas.microsoft.com/office/drawing/2014/main" id="{CFF58543-739D-6121-38A7-01F1133887E7}"/>
-              </a:ext>
-            </a:extLst>
-          </p:cNvPr>
-          <p:cNvPicPr>
-            <a:picLocks noChangeAspect="1"/>
-          </p:cNvPicPr>
-          <p:nvPr/>
-        </p:nvPicPr>
-        <p:blipFill>
-          <a:blip r:embed="rId5"/>
-          <a:stretch>
-            <a:fillRect/>
-          </a:stretch>
-        </p:blipFill>
-        <p:spPr>
-          <a:xfrm>
-            <a:off x="3615998" y="1053375"/>
-            <a:ext cx="2055251" cy="3343800"/>
-          </a:xfrm>
-          <a:prstGeom prst="roundRect">
-            <a:avLst>
-              <a:gd name="adj" fmla="val 8594"/>
-            </a:avLst>
-          </a:prstGeom>
-          <a:solidFill>
-            <a:srgbClr val="FFFFFF">
-              <a:shade val="85000"/>
-            </a:srgbClr>
-          </a:solidFill>
-          <a:ln>
-            <a:noFill/>
-          </a:ln>
-          <a:effectLst/>
-        </p:spPr>
-      </p:pic>
-      <p:pic>
-        <p:nvPicPr>
-          <p:cNvPr id="9" name="Picture 8" descr="A screenshot of a tool finder&#10;&#10;AI-generated content may be incorrect.">
-            <a:extLst>
-              <a:ext uri="{FF2B5EF4-FFF2-40B4-BE49-F238E27FC236}">
-                <a16:creationId xmlns:a16="http://schemas.microsoft.com/office/drawing/2014/main" id="{4CC8680A-51CF-9886-90DD-581B78EAB42B}"/>
-              </a:ext>
-            </a:extLst>
-          </p:cNvPr>
-          <p:cNvPicPr>
-            <a:picLocks noChangeAspect="1"/>
-          </p:cNvPicPr>
-          <p:nvPr/>
-        </p:nvPicPr>
-        <p:blipFill>
-          <a:blip r:embed="rId6"/>
-          <a:stretch>
-            <a:fillRect/>
-          </a:stretch>
-        </p:blipFill>
-        <p:spPr>
-          <a:xfrm>
-            <a:off x="1144857" y="1046324"/>
-            <a:ext cx="2052979" cy="3350851"/>
-          </a:xfrm>
-          <a:prstGeom prst="roundRect">
-            <a:avLst>
-              <a:gd name="adj" fmla="val 8594"/>
-            </a:avLst>
-          </a:prstGeom>
-          <a:solidFill>
-            <a:srgbClr val="FFFFFF">
-              <a:shade val="85000"/>
-            </a:srgbClr>
-          </a:solidFill>
-          <a:ln>
-            <a:noFill/>
-          </a:ln>
-          <a:effectLst/>
-        </p:spPr>
-      </p:pic>
       <p:sp>
         <p:nvSpPr>
           <p:cNvPr id="10" name="Text 2">
@@ -18001,7 +17878,7 @@
         </p:nvSpPr>
         <p:spPr>
           <a:xfrm>
-            <a:off x="1586114" y="749754"/>
+            <a:off x="1682756" y="541600"/>
             <a:ext cx="1117443" cy="309855"/>
           </a:xfrm>
           <a:prstGeom prst="rect">
@@ -18141,7 +18018,7 @@
         </p:nvSpPr>
         <p:spPr>
           <a:xfrm>
-            <a:off x="3881009" y="737491"/>
+            <a:off x="3856190" y="554628"/>
             <a:ext cx="1459587" cy="309855"/>
           </a:xfrm>
           <a:prstGeom prst="rect">
@@ -18278,7 +18155,7 @@
         </p:nvSpPr>
         <p:spPr>
           <a:xfrm>
-            <a:off x="6457462" y="737491"/>
+            <a:off x="6292230" y="549864"/>
             <a:ext cx="1322434" cy="309855"/>
           </a:xfrm>
           <a:prstGeom prst="rect">
@@ -18801,6 +18678,94 @@
           </a:p>
         </p:txBody>
       </p:sp>
+      <p:pic>
+        <p:nvPicPr>
+          <p:cNvPr id="8" name="Picture 7" descr="A screenshot of a phone&#10;&#10;AI-generated content may be incorrect.">
+            <a:extLst>
+              <a:ext uri="{FF2B5EF4-FFF2-40B4-BE49-F238E27FC236}">
+                <a16:creationId xmlns:a16="http://schemas.microsoft.com/office/drawing/2014/main" id="{B7EB3046-4C5E-2D25-6D49-B7F7D84E26E9}"/>
+              </a:ext>
+            </a:extLst>
+          </p:cNvPr>
+          <p:cNvPicPr>
+            <a:picLocks noChangeAspect="1"/>
+          </p:cNvPicPr>
+          <p:nvPr/>
+        </p:nvPicPr>
+        <p:blipFill>
+          <a:blip r:embed="rId4"/>
+          <a:stretch>
+            <a:fillRect/>
+          </a:stretch>
+        </p:blipFill>
+        <p:spPr>
+          <a:xfrm>
+            <a:off x="1425895" y="859719"/>
+            <a:ext cx="1620409" cy="3530020"/>
+          </a:xfrm>
+          <a:prstGeom prst="rect">
+            <a:avLst/>
+          </a:prstGeom>
+        </p:spPr>
+      </p:pic>
+      <p:pic>
+        <p:nvPicPr>
+          <p:cNvPr id="11" name="Picture 10">
+            <a:extLst>
+              <a:ext uri="{FF2B5EF4-FFF2-40B4-BE49-F238E27FC236}">
+                <a16:creationId xmlns:a16="http://schemas.microsoft.com/office/drawing/2014/main" id="{35FE1D43-DC78-03CE-E3A1-9659835D519D}"/>
+              </a:ext>
+            </a:extLst>
+          </p:cNvPr>
+          <p:cNvPicPr>
+            <a:picLocks noChangeAspect="1"/>
+          </p:cNvPicPr>
+          <p:nvPr/>
+        </p:nvPicPr>
+        <p:blipFill>
+          <a:blip r:embed="rId5"/>
+          <a:srcRect/>
+          <a:stretch/>
+        </p:blipFill>
+        <p:spPr>
+          <a:xfrm>
+            <a:off x="3765611" y="859719"/>
+            <a:ext cx="1612777" cy="3530020"/>
+          </a:xfrm>
+          <a:prstGeom prst="rect">
+            <a:avLst/>
+          </a:prstGeom>
+        </p:spPr>
+      </p:pic>
+      <p:pic>
+        <p:nvPicPr>
+          <p:cNvPr id="13" name="Picture 12">
+            <a:extLst>
+              <a:ext uri="{FF2B5EF4-FFF2-40B4-BE49-F238E27FC236}">
+                <a16:creationId xmlns:a16="http://schemas.microsoft.com/office/drawing/2014/main" id="{5E90ED5C-DC38-8028-0F92-82286A3FE18D}"/>
+              </a:ext>
+            </a:extLst>
+          </p:cNvPr>
+          <p:cNvPicPr>
+            <a:picLocks noChangeAspect="1"/>
+          </p:cNvPicPr>
+          <p:nvPr/>
+        </p:nvPicPr>
+        <p:blipFill>
+          <a:blip r:embed="rId6"/>
+          <a:srcRect/>
+          <a:stretch/>
+        </p:blipFill>
+        <p:spPr>
+          <a:xfrm>
+            <a:off x="6147059" y="916784"/>
+            <a:ext cx="1612777" cy="3530020"/>
+          </a:xfrm>
+          <a:prstGeom prst="rect">
+            <a:avLst/>
+          </a:prstGeom>
+        </p:spPr>
+      </p:pic>
     </p:spTree>
     <p:extLst>
       <p:ext uri="{BB962C8B-B14F-4D97-AF65-F5344CB8AC3E}">

</xml_diff>